<commit_message>
combined image files, presentaiton complete
combined image files, my part of presentaiton complete
</commit_message>
<xml_diff>
--- a/Final/Presentations/COVID-19 Stock Presentation.pptx
+++ b/Final/Presentations/COVID-19 Stock Presentation.pptx
@@ -5,7 +5,7 @@
     <p:sldMasterId id="2147483684" r:id="rId1"/>
   </p:sldMasterIdLst>
   <p:notesMasterIdLst>
-    <p:notesMasterId r:id="rId17"/>
+    <p:notesMasterId r:id="rId18"/>
   </p:notesMasterIdLst>
   <p:sldIdLst>
     <p:sldId id="256" r:id="rId2"/>
@@ -22,7 +22,8 @@
     <p:sldId id="270" r:id="rId13"/>
     <p:sldId id="271" r:id="rId14"/>
     <p:sldId id="272" r:id="rId15"/>
-    <p:sldId id="267" r:id="rId16"/>
+    <p:sldId id="273" r:id="rId16"/>
+    <p:sldId id="267" r:id="rId17"/>
   </p:sldIdLst>
   <p:sldSz cx="12192000" cy="6858000"/>
   <p:notesSz cx="6858000" cy="9144000"/>
@@ -178,7 +179,7 @@
             </a:lvl1pPr>
           </a:lstStyle>
           <a:p>
-            <a:endParaRPr lang="en-US"/>
+            <a:endParaRPr lang="en-US" dirty="0"/>
           </a:p>
         </p:txBody>
       </p:sp>
@@ -211,9 +212,9 @@
           <a:p>
             <a:fld id="{6B102BC3-C843-497D-B1BC-6FE6B49A10D3}" type="datetimeFigureOut">
               <a:rPr lang="en-US" smtClean="0"/>
-              <a:t>3/30/2020</a:t>
+              <a:t>3/31/2020</a:t>
             </a:fld>
-            <a:endParaRPr lang="en-US"/>
+            <a:endParaRPr lang="en-US" dirty="0"/>
           </a:p>
         </p:txBody>
       </p:sp>
@@ -246,7 +247,7 @@
           <a:bodyPr vert="horz" lIns="91440" tIns="45720" rIns="91440" bIns="45720" rtlCol="0" anchor="ctr"/>
           <a:lstStyle/>
           <a:p>
-            <a:endParaRPr lang="en-US"/>
+            <a:endParaRPr lang="en-US" dirty="0"/>
           </a:p>
         </p:txBody>
       </p:sp>
@@ -336,7 +337,7 @@
             </a:lvl1pPr>
           </a:lstStyle>
           <a:p>
-            <a:endParaRPr lang="en-US"/>
+            <a:endParaRPr lang="en-US" dirty="0"/>
           </a:p>
         </p:txBody>
       </p:sp>
@@ -371,7 +372,7 @@
               <a:rPr lang="en-US" smtClean="0"/>
               <a:t>‹#›</a:t>
             </a:fld>
-            <a:endParaRPr lang="en-US"/>
+            <a:endParaRPr lang="en-US" dirty="0"/>
           </a:p>
         </p:txBody>
       </p:sp>
@@ -704,9 +705,9 @@
           <a:p>
             <a:fld id="{4FC7693F-CA52-40C2-B8BE-F202308C5D29}" type="datetimeFigureOut">
               <a:rPr lang="en-US" smtClean="0"/>
-              <a:t>3/30/2020</a:t>
+              <a:t>3/31/2020</a:t>
             </a:fld>
-            <a:endParaRPr lang="en-US"/>
+            <a:endParaRPr lang="en-US" dirty="0"/>
           </a:p>
         </p:txBody>
       </p:sp>
@@ -725,7 +726,7 @@
           <a:bodyPr/>
           <a:lstStyle/>
           <a:p>
-            <a:endParaRPr lang="en-US"/>
+            <a:endParaRPr lang="en-US" dirty="0"/>
           </a:p>
         </p:txBody>
       </p:sp>
@@ -748,7 +749,7 @@
               <a:rPr lang="en-US" smtClean="0"/>
               <a:t>‹#›</a:t>
             </a:fld>
-            <a:endParaRPr lang="en-US"/>
+            <a:endParaRPr lang="en-US" dirty="0"/>
           </a:p>
         </p:txBody>
       </p:sp>
@@ -912,9 +913,9 @@
           <a:p>
             <a:fld id="{4FC7693F-CA52-40C2-B8BE-F202308C5D29}" type="datetimeFigureOut">
               <a:rPr lang="en-US" smtClean="0"/>
-              <a:t>3/30/2020</a:t>
+              <a:t>3/31/2020</a:t>
             </a:fld>
-            <a:endParaRPr lang="en-US"/>
+            <a:endParaRPr lang="en-US" dirty="0"/>
           </a:p>
         </p:txBody>
       </p:sp>
@@ -933,7 +934,7 @@
           <a:bodyPr/>
           <a:lstStyle/>
           <a:p>
-            <a:endParaRPr lang="en-US"/>
+            <a:endParaRPr lang="en-US" dirty="0"/>
           </a:p>
         </p:txBody>
       </p:sp>
@@ -956,7 +957,7 @@
               <a:rPr lang="en-US" smtClean="0"/>
               <a:t>‹#›</a:t>
             </a:fld>
-            <a:endParaRPr lang="en-US"/>
+            <a:endParaRPr lang="en-US" dirty="0"/>
           </a:p>
         </p:txBody>
       </p:sp>
@@ -1168,9 +1169,9 @@
           <a:p>
             <a:fld id="{4FC7693F-CA52-40C2-B8BE-F202308C5D29}" type="datetimeFigureOut">
               <a:rPr lang="en-US" smtClean="0"/>
-              <a:t>3/30/2020</a:t>
+              <a:t>3/31/2020</a:t>
             </a:fld>
-            <a:endParaRPr lang="en-US"/>
+            <a:endParaRPr lang="en-US" dirty="0"/>
           </a:p>
         </p:txBody>
       </p:sp>
@@ -1189,7 +1190,7 @@
           <a:bodyPr/>
           <a:lstStyle/>
           <a:p>
-            <a:endParaRPr lang="en-US"/>
+            <a:endParaRPr lang="en-US" dirty="0"/>
           </a:p>
         </p:txBody>
       </p:sp>
@@ -1212,7 +1213,7 @@
               <a:rPr lang="en-US" smtClean="0"/>
               <a:t>‹#›</a:t>
             </a:fld>
-            <a:endParaRPr lang="en-US"/>
+            <a:endParaRPr lang="en-US" dirty="0"/>
           </a:p>
         </p:txBody>
       </p:sp>
@@ -1342,9 +1343,9 @@
           <a:p>
             <a:fld id="{4FC7693F-CA52-40C2-B8BE-F202308C5D29}" type="datetimeFigureOut">
               <a:rPr lang="en-US" smtClean="0"/>
-              <a:t>3/30/2020</a:t>
+              <a:t>3/31/2020</a:t>
             </a:fld>
-            <a:endParaRPr lang="en-US"/>
+            <a:endParaRPr lang="en-US" dirty="0"/>
           </a:p>
         </p:txBody>
       </p:sp>
@@ -1363,7 +1364,7 @@
           <a:bodyPr/>
           <a:lstStyle/>
           <a:p>
-            <a:endParaRPr lang="en-US"/>
+            <a:endParaRPr lang="en-US" dirty="0"/>
           </a:p>
         </p:txBody>
       </p:sp>
@@ -1386,7 +1387,7 @@
               <a:rPr lang="en-US" smtClean="0"/>
               <a:t>‹#›</a:t>
             </a:fld>
-            <a:endParaRPr lang="en-US"/>
+            <a:endParaRPr lang="en-US" dirty="0"/>
           </a:p>
         </p:txBody>
       </p:sp>
@@ -1677,9 +1678,9 @@
           <a:p>
             <a:fld id="{4FC7693F-CA52-40C2-B8BE-F202308C5D29}" type="datetimeFigureOut">
               <a:rPr lang="en-US" smtClean="0"/>
-              <a:t>3/30/2020</a:t>
+              <a:t>3/31/2020</a:t>
             </a:fld>
-            <a:endParaRPr lang="en-US"/>
+            <a:endParaRPr lang="en-US" dirty="0"/>
           </a:p>
         </p:txBody>
       </p:sp>
@@ -1698,7 +1699,7 @@
           <a:bodyPr/>
           <a:lstStyle/>
           <a:p>
-            <a:endParaRPr lang="en-US"/>
+            <a:endParaRPr lang="en-US" dirty="0"/>
           </a:p>
         </p:txBody>
       </p:sp>
@@ -1721,7 +1722,7 @@
               <a:rPr lang="en-US" smtClean="0"/>
               <a:t>‹#›</a:t>
             </a:fld>
-            <a:endParaRPr lang="en-US"/>
+            <a:endParaRPr lang="en-US" dirty="0"/>
           </a:p>
         </p:txBody>
       </p:sp>
@@ -1952,9 +1953,9 @@
           <a:p>
             <a:fld id="{4FC7693F-CA52-40C2-B8BE-F202308C5D29}" type="datetimeFigureOut">
               <a:rPr lang="en-US" smtClean="0"/>
-              <a:t>3/30/2020</a:t>
+              <a:t>3/31/2020</a:t>
             </a:fld>
-            <a:endParaRPr lang="en-US"/>
+            <a:endParaRPr lang="en-US" dirty="0"/>
           </a:p>
         </p:txBody>
       </p:sp>
@@ -1973,7 +1974,7 @@
           <a:bodyPr/>
           <a:lstStyle/>
           <a:p>
-            <a:endParaRPr lang="en-US"/>
+            <a:endParaRPr lang="en-US" dirty="0"/>
           </a:p>
         </p:txBody>
       </p:sp>
@@ -1996,7 +1997,7 @@
               <a:rPr lang="en-US" smtClean="0"/>
               <a:t>‹#›</a:t>
             </a:fld>
-            <a:endParaRPr lang="en-US"/>
+            <a:endParaRPr lang="en-US" dirty="0"/>
           </a:p>
         </p:txBody>
       </p:sp>
@@ -2331,9 +2332,9 @@
           <a:p>
             <a:fld id="{4FC7693F-CA52-40C2-B8BE-F202308C5D29}" type="datetimeFigureOut">
               <a:rPr lang="en-US" smtClean="0"/>
-              <a:t>3/30/2020</a:t>
+              <a:t>3/31/2020</a:t>
             </a:fld>
-            <a:endParaRPr lang="en-US"/>
+            <a:endParaRPr lang="en-US" dirty="0"/>
           </a:p>
         </p:txBody>
       </p:sp>
@@ -2352,7 +2353,7 @@
           <a:bodyPr/>
           <a:lstStyle/>
           <a:p>
-            <a:endParaRPr lang="en-US"/>
+            <a:endParaRPr lang="en-US" dirty="0"/>
           </a:p>
         </p:txBody>
       </p:sp>
@@ -2375,7 +2376,7 @@
               <a:rPr lang="en-US" smtClean="0"/>
               <a:t>‹#›</a:t>
             </a:fld>
-            <a:endParaRPr lang="en-US"/>
+            <a:endParaRPr lang="en-US" dirty="0"/>
           </a:p>
         </p:txBody>
       </p:sp>
@@ -2449,9 +2450,9 @@
           <a:p>
             <a:fld id="{4FC7693F-CA52-40C2-B8BE-F202308C5D29}" type="datetimeFigureOut">
               <a:rPr lang="en-US" smtClean="0"/>
-              <a:t>3/30/2020</a:t>
+              <a:t>3/31/2020</a:t>
             </a:fld>
-            <a:endParaRPr lang="en-US"/>
+            <a:endParaRPr lang="en-US" dirty="0"/>
           </a:p>
         </p:txBody>
       </p:sp>
@@ -2470,7 +2471,7 @@
           <a:bodyPr/>
           <a:lstStyle/>
           <a:p>
-            <a:endParaRPr lang="en-US"/>
+            <a:endParaRPr lang="en-US" dirty="0"/>
           </a:p>
         </p:txBody>
       </p:sp>
@@ -2493,7 +2494,7 @@
               <a:rPr lang="en-US" smtClean="0"/>
               <a:t>‹#›</a:t>
             </a:fld>
-            <a:endParaRPr lang="en-US"/>
+            <a:endParaRPr lang="en-US" dirty="0"/>
           </a:p>
         </p:txBody>
       </p:sp>
@@ -2620,9 +2621,9 @@
           <a:p>
             <a:fld id="{4FC7693F-CA52-40C2-B8BE-F202308C5D29}" type="datetimeFigureOut">
               <a:rPr lang="en-US" smtClean="0"/>
-              <a:t>3/30/2020</a:t>
+              <a:t>3/31/2020</a:t>
             </a:fld>
-            <a:endParaRPr lang="en-US"/>
+            <a:endParaRPr lang="en-US" dirty="0"/>
           </a:p>
         </p:txBody>
       </p:sp>
@@ -2649,7 +2650,7 @@
             </a:lvl1pPr>
           </a:lstStyle>
           <a:p>
-            <a:endParaRPr lang="en-US"/>
+            <a:endParaRPr lang="en-US" dirty="0"/>
           </a:p>
         </p:txBody>
       </p:sp>
@@ -2672,7 +2673,7 @@
               <a:rPr lang="en-US" smtClean="0"/>
               <a:t>‹#›</a:t>
             </a:fld>
-            <a:endParaRPr lang="en-US"/>
+            <a:endParaRPr lang="en-US" dirty="0"/>
           </a:p>
         </p:txBody>
       </p:sp>
@@ -2974,9 +2975,9 @@
           <a:p>
             <a:fld id="{4FC7693F-CA52-40C2-B8BE-F202308C5D29}" type="datetimeFigureOut">
               <a:rPr lang="en-US" smtClean="0"/>
-              <a:t>3/30/2020</a:t>
+              <a:t>3/31/2020</a:t>
             </a:fld>
-            <a:endParaRPr lang="en-US"/>
+            <a:endParaRPr lang="en-US" dirty="0"/>
           </a:p>
         </p:txBody>
       </p:sp>
@@ -3008,7 +3009,7 @@
             </a:lvl1pPr>
           </a:lstStyle>
           <a:p>
-            <a:endParaRPr lang="en-US"/>
+            <a:endParaRPr lang="en-US" dirty="0"/>
           </a:p>
         </p:txBody>
       </p:sp>
@@ -3039,7 +3040,7 @@
               <a:rPr lang="en-US" smtClean="0"/>
               <a:t>‹#›</a:t>
             </a:fld>
-            <a:endParaRPr lang="en-US"/>
+            <a:endParaRPr lang="en-US" dirty="0"/>
           </a:p>
         </p:txBody>
       </p:sp>
@@ -3255,10 +3256,9 @@
           </a:lstStyle>
           <a:p>
             <a:r>
-              <a:rPr lang="en-US"/>
+              <a:rPr lang="en-US" dirty="0"/>
               <a:t>Click icon to add picture</a:t>
             </a:r>
-            <a:endParaRPr lang="en-US" dirty="0"/>
           </a:p>
         </p:txBody>
       </p:sp>
@@ -3356,9 +3356,9 @@
           <a:p>
             <a:fld id="{4FC7693F-CA52-40C2-B8BE-F202308C5D29}" type="datetimeFigureOut">
               <a:rPr lang="en-US" smtClean="0"/>
-              <a:t>3/30/2020</a:t>
+              <a:t>3/31/2020</a:t>
             </a:fld>
-            <a:endParaRPr lang="en-US"/>
+            <a:endParaRPr lang="en-US" dirty="0"/>
           </a:p>
         </p:txBody>
       </p:sp>
@@ -3377,7 +3377,7 @@
           <a:bodyPr/>
           <a:lstStyle/>
           <a:p>
-            <a:endParaRPr lang="en-US"/>
+            <a:endParaRPr lang="en-US" dirty="0"/>
           </a:p>
         </p:txBody>
       </p:sp>
@@ -3400,7 +3400,7 @@
               <a:rPr lang="en-US" smtClean="0"/>
               <a:t>‹#›</a:t>
             </a:fld>
-            <a:endParaRPr lang="en-US"/>
+            <a:endParaRPr lang="en-US" dirty="0"/>
           </a:p>
         </p:txBody>
       </p:sp>
@@ -3653,9 +3653,9 @@
           <a:p>
             <a:fld id="{4FC7693F-CA52-40C2-B8BE-F202308C5D29}" type="datetimeFigureOut">
               <a:rPr lang="en-US" smtClean="0"/>
-              <a:t>3/30/2020</a:t>
+              <a:t>3/31/2020</a:t>
             </a:fld>
-            <a:endParaRPr lang="en-US"/>
+            <a:endParaRPr lang="en-US" dirty="0"/>
           </a:p>
         </p:txBody>
       </p:sp>
@@ -3690,7 +3690,7 @@
             </a:lvl1pPr>
           </a:lstStyle>
           <a:p>
-            <a:endParaRPr lang="en-US"/>
+            <a:endParaRPr lang="en-US" dirty="0"/>
           </a:p>
         </p:txBody>
       </p:sp>
@@ -3729,7 +3729,7 @@
               <a:rPr lang="en-US" smtClean="0"/>
               <a:t>‹#›</a:t>
             </a:fld>
-            <a:endParaRPr lang="en-US"/>
+            <a:endParaRPr lang="en-US" dirty="0"/>
           </a:p>
         </p:txBody>
       </p:sp>
@@ -4314,11 +4314,41 @@
             <a:pPr algn="ctr"/>
             <a:r>
               <a:rPr lang="en-US" sz="4400" dirty="0"/>
-              <a:t>(Car Industry)</a:t>
-            </a:r>
-          </a:p>
-        </p:txBody>
-      </p:sp>
+              <a:t>(Automotive Industry)</a:t>
+            </a:r>
+          </a:p>
+        </p:txBody>
+      </p:sp>
+      <p:pic>
+        <p:nvPicPr>
+          <p:cNvPr id="4" name="Picture 3">
+            <a:extLst>
+              <a:ext uri="{FF2B5EF4-FFF2-40B4-BE49-F238E27FC236}">
+                <a16:creationId xmlns:a16="http://schemas.microsoft.com/office/drawing/2014/main" id="{996C3D88-03E8-472E-B725-C9EEC9C65134}"/>
+              </a:ext>
+            </a:extLst>
+          </p:cNvPr>
+          <p:cNvPicPr>
+            <a:picLocks noChangeAspect="1"/>
+          </p:cNvPicPr>
+          <p:nvPr/>
+        </p:nvPicPr>
+        <p:blipFill>
+          <a:blip r:embed="rId2"/>
+          <a:stretch>
+            <a:fillRect/>
+          </a:stretch>
+        </p:blipFill>
+        <p:spPr>
+          <a:xfrm>
+            <a:off x="0" y="1446550"/>
+            <a:ext cx="12192000" cy="5411450"/>
+          </a:xfrm>
+          <a:prstGeom prst="rect">
+            <a:avLst/>
+          </a:prstGeom>
+        </p:spPr>
+      </p:pic>
     </p:spTree>
     <p:extLst>
       <p:ext uri="{BB962C8B-B14F-4D97-AF65-F5344CB8AC3E}">
@@ -4392,6 +4422,36 @@
           </a:p>
         </p:txBody>
       </p:sp>
+      <p:pic>
+        <p:nvPicPr>
+          <p:cNvPr id="2" name="Picture 1">
+            <a:extLst>
+              <a:ext uri="{FF2B5EF4-FFF2-40B4-BE49-F238E27FC236}">
+                <a16:creationId xmlns:a16="http://schemas.microsoft.com/office/drawing/2014/main" id="{CAC947B3-104A-42FD-A63B-BDB50AE07EAF}"/>
+              </a:ext>
+            </a:extLst>
+          </p:cNvPr>
+          <p:cNvPicPr>
+            <a:picLocks noChangeAspect="1"/>
+          </p:cNvPicPr>
+          <p:nvPr/>
+        </p:nvPicPr>
+        <p:blipFill>
+          <a:blip r:embed="rId2"/>
+          <a:stretch>
+            <a:fillRect/>
+          </a:stretch>
+        </p:blipFill>
+        <p:spPr>
+          <a:xfrm>
+            <a:off x="0" y="1446550"/>
+            <a:ext cx="12192000" cy="5411450"/>
+          </a:xfrm>
+          <a:prstGeom prst="rect">
+            <a:avLst/>
+          </a:prstGeom>
+        </p:spPr>
+      </p:pic>
     </p:spTree>
     <p:extLst>
       <p:ext uri="{BB962C8B-B14F-4D97-AF65-F5344CB8AC3E}">
@@ -4465,6 +4525,36 @@
           </a:p>
         </p:txBody>
       </p:sp>
+      <p:pic>
+        <p:nvPicPr>
+          <p:cNvPr id="2" name="Picture 1">
+            <a:extLst>
+              <a:ext uri="{FF2B5EF4-FFF2-40B4-BE49-F238E27FC236}">
+                <a16:creationId xmlns:a16="http://schemas.microsoft.com/office/drawing/2014/main" id="{D3B09590-192E-41E1-942A-5D31065CFAED}"/>
+              </a:ext>
+            </a:extLst>
+          </p:cNvPr>
+          <p:cNvPicPr>
+            <a:picLocks noChangeAspect="1"/>
+          </p:cNvPicPr>
+          <p:nvPr/>
+        </p:nvPicPr>
+        <p:blipFill>
+          <a:blip r:embed="rId2"/>
+          <a:stretch>
+            <a:fillRect/>
+          </a:stretch>
+        </p:blipFill>
+        <p:spPr>
+          <a:xfrm>
+            <a:off x="-1" y="1446550"/>
+            <a:ext cx="12192000" cy="5411450"/>
+          </a:xfrm>
+          <a:prstGeom prst="rect">
+            <a:avLst/>
+          </a:prstGeom>
+        </p:spPr>
+      </p:pic>
     </p:spTree>
     <p:extLst>
       <p:ext uri="{BB962C8B-B14F-4D97-AF65-F5344CB8AC3E}">
@@ -4538,6 +4628,36 @@
           </a:p>
         </p:txBody>
       </p:sp>
+      <p:pic>
+        <p:nvPicPr>
+          <p:cNvPr id="2" name="Picture 1">
+            <a:extLst>
+              <a:ext uri="{FF2B5EF4-FFF2-40B4-BE49-F238E27FC236}">
+                <a16:creationId xmlns:a16="http://schemas.microsoft.com/office/drawing/2014/main" id="{3090BBCD-EC4E-4E91-B793-CC5D824EAA99}"/>
+              </a:ext>
+            </a:extLst>
+          </p:cNvPr>
+          <p:cNvPicPr>
+            <a:picLocks noChangeAspect="1"/>
+          </p:cNvPicPr>
+          <p:nvPr/>
+        </p:nvPicPr>
+        <p:blipFill>
+          <a:blip r:embed="rId2"/>
+          <a:stretch>
+            <a:fillRect/>
+          </a:stretch>
+        </p:blipFill>
+        <p:spPr>
+          <a:xfrm>
+            <a:off x="-1" y="1446550"/>
+            <a:ext cx="12192000" cy="5411450"/>
+          </a:xfrm>
+          <a:prstGeom prst="rect">
+            <a:avLst/>
+          </a:prstGeom>
+        </p:spPr>
+      </p:pic>
     </p:spTree>
     <p:extLst>
       <p:ext uri="{BB962C8B-B14F-4D97-AF65-F5344CB8AC3E}">
@@ -4611,6 +4731,36 @@
           </a:p>
         </p:txBody>
       </p:sp>
+      <p:pic>
+        <p:nvPicPr>
+          <p:cNvPr id="2" name="Picture 1">
+            <a:extLst>
+              <a:ext uri="{FF2B5EF4-FFF2-40B4-BE49-F238E27FC236}">
+                <a16:creationId xmlns:a16="http://schemas.microsoft.com/office/drawing/2014/main" id="{EDD2CBC4-9628-4BBA-88BC-F5751913F65E}"/>
+              </a:ext>
+            </a:extLst>
+          </p:cNvPr>
+          <p:cNvPicPr>
+            <a:picLocks noChangeAspect="1"/>
+          </p:cNvPicPr>
+          <p:nvPr/>
+        </p:nvPicPr>
+        <p:blipFill>
+          <a:blip r:embed="rId2"/>
+          <a:stretch>
+            <a:fillRect/>
+          </a:stretch>
+        </p:blipFill>
+        <p:spPr>
+          <a:xfrm>
+            <a:off x="-1" y="1446550"/>
+            <a:ext cx="12192000" cy="5411450"/>
+          </a:xfrm>
+          <a:prstGeom prst="rect">
+            <a:avLst/>
+          </a:prstGeom>
+        </p:spPr>
+      </p:pic>
     </p:spTree>
     <p:extLst>
       <p:ext uri="{BB962C8B-B14F-4D97-AF65-F5344CB8AC3E}">
@@ -4625,6 +4775,280 @@
 </file>
 
 <file path=ppt/slides/slide15.xml><?xml version="1.0" encoding="utf-8"?>
+<p:sld xmlns:a="http://schemas.openxmlformats.org/drawingml/2006/main" xmlns:r="http://schemas.openxmlformats.org/officeDocument/2006/relationships" xmlns:p="http://schemas.openxmlformats.org/presentationml/2006/main">
+  <p:cSld>
+    <p:spTree>
+      <p:nvGrpSpPr>
+        <p:cNvPr id="1" name=""/>
+        <p:cNvGrpSpPr/>
+        <p:nvPr/>
+      </p:nvGrpSpPr>
+      <p:grpSpPr>
+        <a:xfrm>
+          <a:off x="0" y="0"/>
+          <a:ext cx="0" cy="0"/>
+          <a:chOff x="0" y="0"/>
+          <a:chExt cx="0" cy="0"/>
+        </a:xfrm>
+      </p:grpSpPr>
+      <p:sp>
+        <p:nvSpPr>
+          <p:cNvPr id="2" name="TextBox 1">
+            <a:extLst>
+              <a:ext uri="{FF2B5EF4-FFF2-40B4-BE49-F238E27FC236}">
+                <a16:creationId xmlns:a16="http://schemas.microsoft.com/office/drawing/2014/main" id="{A87E9152-FE9C-48C8-9BA4-1BB22C6B731D}"/>
+              </a:ext>
+            </a:extLst>
+          </p:cNvPr>
+          <p:cNvSpPr txBox="1"/>
+          <p:nvPr/>
+        </p:nvSpPr>
+        <p:spPr>
+          <a:xfrm>
+            <a:off x="1170085" y="418781"/>
+            <a:ext cx="9989062" cy="1015663"/>
+          </a:xfrm>
+          <a:prstGeom prst="rect">
+            <a:avLst/>
+          </a:prstGeom>
+          <a:noFill/>
+        </p:spPr>
+        <p:txBody>
+          <a:bodyPr wrap="square" rtlCol="0">
+            <a:spAutoFit/>
+          </a:bodyPr>
+          <a:lstStyle/>
+          <a:p>
+            <a:pPr algn="ctr"/>
+            <a:r>
+              <a:rPr lang="en-US" sz="6000" dirty="0"/>
+              <a:t>Conclusion</a:t>
+            </a:r>
+          </a:p>
+        </p:txBody>
+      </p:sp>
+      <p:sp>
+        <p:nvSpPr>
+          <p:cNvPr id="3" name="TextBox 2">
+            <a:extLst>
+              <a:ext uri="{FF2B5EF4-FFF2-40B4-BE49-F238E27FC236}">
+                <a16:creationId xmlns:a16="http://schemas.microsoft.com/office/drawing/2014/main" id="{060CA047-2449-4DF5-8CF6-41650548E87F}"/>
+              </a:ext>
+            </a:extLst>
+          </p:cNvPr>
+          <p:cNvSpPr txBox="1"/>
+          <p:nvPr/>
+        </p:nvSpPr>
+        <p:spPr>
+          <a:xfrm>
+            <a:off x="1170085" y="1824409"/>
+            <a:ext cx="9989062" cy="2031325"/>
+          </a:xfrm>
+          <a:prstGeom prst="rect">
+            <a:avLst/>
+          </a:prstGeom>
+          <a:noFill/>
+        </p:spPr>
+        <p:txBody>
+          <a:bodyPr wrap="square" rtlCol="0">
+            <a:spAutoFit/>
+          </a:bodyPr>
+          <a:lstStyle/>
+          <a:p>
+            <a:pPr marL="285750" indent="-285750">
+              <a:buFont typeface="Arial" panose="020B0604020202020204" pitchFamily="34" charset="0"/>
+              <a:buChar char="•"/>
+            </a:pPr>
+            <a:r>
+              <a:rPr lang="en-US" dirty="0">
+                <a:latin typeface="Times New Roman" panose="02020603050405020304" pitchFamily="18" charset="0"/>
+                <a:cs typeface="Times New Roman" panose="02020603050405020304" pitchFamily="18" charset="0"/>
+              </a:rPr>
+              <a:t>Most markets are performing similarly to the overall indexes.</a:t>
+            </a:r>
+          </a:p>
+          <a:p>
+            <a:pPr marL="742950" lvl="1" indent="-285750">
+              <a:buFont typeface="Arial" panose="020B0604020202020204" pitchFamily="34" charset="0"/>
+              <a:buChar char="•"/>
+            </a:pPr>
+            <a:r>
+              <a:rPr lang="en-US" dirty="0">
+                <a:latin typeface="Times New Roman" panose="02020603050405020304" pitchFamily="18" charset="0"/>
+                <a:cs typeface="Times New Roman" panose="02020603050405020304" pitchFamily="18" charset="0"/>
+              </a:rPr>
+              <a:t>The Automotive, Food &amp; Beverage, and Commodities Industries/Stocks are performing about the same as the overall market. This isn’t much of a surprise, as some auto manufacturers are retro-fitting equipment to help with the pandemic.</a:t>
+            </a:r>
+          </a:p>
+          <a:p>
+            <a:pPr marL="742950" lvl="1" indent="-285750">
+              <a:buFont typeface="Arial" panose="020B0604020202020204" pitchFamily="34" charset="0"/>
+              <a:buChar char="•"/>
+            </a:pPr>
+            <a:r>
+              <a:rPr lang="en-US" dirty="0">
+                <a:latin typeface="Times New Roman" panose="02020603050405020304" pitchFamily="18" charset="0"/>
+                <a:cs typeface="Times New Roman" panose="02020603050405020304" pitchFamily="18" charset="0"/>
+              </a:rPr>
+              <a:t>Telecommunications is the only market that has outperformed the market since the crash.</a:t>
+            </a:r>
+          </a:p>
+          <a:p>
+            <a:pPr marL="742950" lvl="1" indent="-285750">
+              <a:buFont typeface="Arial" panose="020B0604020202020204" pitchFamily="34" charset="0"/>
+              <a:buChar char="•"/>
+            </a:pPr>
+            <a:r>
+              <a:rPr lang="en-US" dirty="0">
+                <a:latin typeface="Times New Roman" panose="02020603050405020304" pitchFamily="18" charset="0"/>
+                <a:cs typeface="Times New Roman" panose="02020603050405020304" pitchFamily="18" charset="0"/>
+              </a:rPr>
+              <a:t>The retail industry has been hit hard. With forced closures of non-essential businesses, and people unable to work, they will be focusing on purchasing only the essentials.</a:t>
+            </a:r>
+          </a:p>
+        </p:txBody>
+      </p:sp>
+      <p:sp>
+        <p:nvSpPr>
+          <p:cNvPr id="4" name="TextBox 3">
+            <a:extLst>
+              <a:ext uri="{FF2B5EF4-FFF2-40B4-BE49-F238E27FC236}">
+                <a16:creationId xmlns:a16="http://schemas.microsoft.com/office/drawing/2014/main" id="{5B56033C-9943-46D4-B5C2-3CC9AD747C29}"/>
+              </a:ext>
+            </a:extLst>
+          </p:cNvPr>
+          <p:cNvSpPr txBox="1"/>
+          <p:nvPr/>
+        </p:nvSpPr>
+        <p:spPr>
+          <a:xfrm>
+            <a:off x="1170085" y="5405105"/>
+            <a:ext cx="8992322" cy="923330"/>
+          </a:xfrm>
+          <a:prstGeom prst="rect">
+            <a:avLst/>
+          </a:prstGeom>
+          <a:noFill/>
+        </p:spPr>
+        <p:txBody>
+          <a:bodyPr wrap="square" rtlCol="0">
+            <a:spAutoFit/>
+          </a:bodyPr>
+          <a:lstStyle/>
+          <a:p>
+            <a:pPr marL="285750" indent="-285750">
+              <a:buFont typeface="Arial" panose="020B0604020202020204" pitchFamily="34" charset="0"/>
+              <a:buChar char="•"/>
+            </a:pPr>
+            <a:r>
+              <a:rPr lang="en-US" dirty="0"/>
+              <a:t>Low sample size</a:t>
+            </a:r>
+          </a:p>
+          <a:p>
+            <a:pPr marL="285750" indent="-285750">
+              <a:buFont typeface="Arial" panose="020B0604020202020204" pitchFamily="34" charset="0"/>
+              <a:buChar char="•"/>
+            </a:pPr>
+            <a:r>
+              <a:rPr lang="en-US" dirty="0"/>
+              <a:t>Somewhat limited API</a:t>
+            </a:r>
+          </a:p>
+          <a:p>
+            <a:pPr marL="285750" indent="-285750">
+              <a:buFont typeface="Arial" panose="020B0604020202020204" pitchFamily="34" charset="0"/>
+              <a:buChar char="•"/>
+            </a:pPr>
+            <a:r>
+              <a:rPr lang="en-US" dirty="0"/>
+              <a:t>Time</a:t>
+            </a:r>
+          </a:p>
+        </p:txBody>
+      </p:sp>
+      <p:sp>
+        <p:nvSpPr>
+          <p:cNvPr id="5" name="TextBox 4">
+            <a:extLst>
+              <a:ext uri="{FF2B5EF4-FFF2-40B4-BE49-F238E27FC236}">
+                <a16:creationId xmlns:a16="http://schemas.microsoft.com/office/drawing/2014/main" id="{9F42FB6C-9082-4794-973B-9913A1F0CC7A}"/>
+              </a:ext>
+            </a:extLst>
+          </p:cNvPr>
+          <p:cNvSpPr txBox="1"/>
+          <p:nvPr/>
+        </p:nvSpPr>
+        <p:spPr>
+          <a:xfrm>
+            <a:off x="6166783" y="4493994"/>
+            <a:ext cx="184731" cy="369332"/>
+          </a:xfrm>
+          <a:prstGeom prst="rect">
+            <a:avLst/>
+          </a:prstGeom>
+          <a:noFill/>
+        </p:spPr>
+        <p:txBody>
+          <a:bodyPr wrap="none" rtlCol="0">
+            <a:spAutoFit/>
+          </a:bodyPr>
+          <a:lstStyle/>
+          <a:p>
+            <a:endParaRPr lang="en-US" dirty="0"/>
+          </a:p>
+        </p:txBody>
+      </p:sp>
+      <p:sp>
+        <p:nvSpPr>
+          <p:cNvPr id="6" name="TextBox 5">
+            <a:extLst>
+              <a:ext uri="{FF2B5EF4-FFF2-40B4-BE49-F238E27FC236}">
+                <a16:creationId xmlns:a16="http://schemas.microsoft.com/office/drawing/2014/main" id="{AB5B0995-CC48-497C-8934-5203DF1F8C18}"/>
+              </a:ext>
+            </a:extLst>
+          </p:cNvPr>
+          <p:cNvSpPr txBox="1"/>
+          <p:nvPr/>
+        </p:nvSpPr>
+        <p:spPr>
+          <a:xfrm>
+            <a:off x="2434066" y="4245699"/>
+            <a:ext cx="7323868" cy="769441"/>
+          </a:xfrm>
+          <a:prstGeom prst="rect">
+            <a:avLst/>
+          </a:prstGeom>
+          <a:noFill/>
+        </p:spPr>
+        <p:txBody>
+          <a:bodyPr wrap="square" rtlCol="0">
+            <a:spAutoFit/>
+          </a:bodyPr>
+          <a:lstStyle/>
+          <a:p>
+            <a:pPr algn="ctr"/>
+            <a:r>
+              <a:rPr lang="en-US" sz="4400" dirty="0"/>
+              <a:t>Limitations</a:t>
+            </a:r>
+          </a:p>
+        </p:txBody>
+      </p:sp>
+    </p:spTree>
+    <p:extLst>
+      <p:ext uri="{BB962C8B-B14F-4D97-AF65-F5344CB8AC3E}">
+        <p14:creationId xmlns:p14="http://schemas.microsoft.com/office/powerpoint/2010/main" val="760206418"/>
+      </p:ext>
+    </p:extLst>
+  </p:cSld>
+  <p:clrMapOvr>
+    <a:masterClrMapping/>
+  </p:clrMapOvr>
+</p:sld>
+</file>
+
+<file path=ppt/slides/slide16.xml><?xml version="1.0" encoding="utf-8"?>
 <p:sld xmlns:a="http://schemas.openxmlformats.org/drawingml/2006/main" xmlns:r="http://schemas.openxmlformats.org/officeDocument/2006/relationships" xmlns:p="http://schemas.openxmlformats.org/presentationml/2006/main">
   <p:cSld>
     <p:spTree>
@@ -6057,21 +6481,7 @@
                 <a:latin typeface="Times New Roman" panose="02020603050405020304" pitchFamily="18" charset="0"/>
                 <a:cs typeface="Times New Roman" panose="02020603050405020304" pitchFamily="18" charset="0"/>
               </a:rPr>
-              <a:t>We examine the sampling of 5 ETFs from different industries and compare them to the DOW Jones Industrial Average and S&amp;P 500 Indexes to see their performance after the 2020 market </a:t>
-            </a:r>
-            <a:r>
-              <a:rPr lang="en-US">
-                <a:latin typeface="Times New Roman" panose="02020603050405020304" pitchFamily="18" charset="0"/>
-                <a:cs typeface="Times New Roman" panose="02020603050405020304" pitchFamily="18" charset="0"/>
-              </a:rPr>
-              <a:t>crash caused by COVID-19. </a:t>
-            </a:r>
-            <a:r>
-              <a:rPr lang="en-US" dirty="0">
-                <a:latin typeface="Times New Roman" panose="02020603050405020304" pitchFamily="18" charset="0"/>
-                <a:cs typeface="Times New Roman" panose="02020603050405020304" pitchFamily="18" charset="0"/>
-              </a:rPr>
-              <a:t>(2/20/20)</a:t>
+              <a:t>We examine the sampling of 5 ETFs from different industries and compare them to the DOW Jones Industrial Average and S&amp;P 500 Indexes to see their performance after the 2020 market crash caused by COVID-19. (2/20/20)</a:t>
             </a:r>
           </a:p>
         </p:txBody>

</xml_diff>